<commit_message>
Added updated cluster template to be used with the certificates, updated presentation and associated readme
</commit_message>
<xml_diff>
--- a/Presentations/Service Fabric/ServiceFabric - Real World.pptx
+++ b/Presentations/Service Fabric/ServiceFabric - Real World.pptx
@@ -316,7 +316,7 @@
               <a:rPr lang="en-US" smtClean="0">
                 <a:latin typeface="Segoe UI" pitchFamily="34" charset="0"/>
               </a:rPr>
-              <a:t>3/27/2017 10:59 AM</a:t>
+              <a:t>3/30/2017 7:13 AM</a:t>
             </a:fld>
             <a:endParaRPr lang="en-US" dirty="0">
               <a:latin typeface="Segoe UI" pitchFamily="34" charset="0"/>
@@ -660,7 +660,7 @@
           <a:p>
             <a:fld id="{38EEC551-8CDA-4EB6-89BB-2A86C9F091C8}" type="datetime8">
               <a:rPr lang="en-US" smtClean="0"/>
-              <a:t>3/27/2017 10:58 AM</a:t>
+              <a:t>3/30/2017 7:13 AM</a:t>
             </a:fld>
             <a:endParaRPr lang="en-US" dirty="0"/>
           </a:p>
@@ -1055,7 +1055,7 @@
           <a:p>
             <a:fld id="{38EEC551-8CDA-4EB6-89BB-2A86C9F091C8}" type="datetime8">
               <a:rPr lang="en-US" smtClean="0"/>
-              <a:t>3/27/2017 10:58 AM</a:t>
+              <a:t>3/30/2017 7:13 AM</a:t>
             </a:fld>
             <a:endParaRPr lang="en-US" dirty="0"/>
           </a:p>
@@ -1270,7 +1270,7 @@
           <a:p>
             <a:fld id="{38EEC551-8CDA-4EB6-89BB-2A86C9F091C8}" type="datetime8">
               <a:rPr lang="en-US" smtClean="0"/>
-              <a:t>3/27/2017 10:58 AM</a:t>
+              <a:t>3/30/2017 7:13 AM</a:t>
             </a:fld>
             <a:endParaRPr lang="en-US" dirty="0"/>
           </a:p>
@@ -1491,7 +1491,7 @@
           <a:p>
             <a:fld id="{38EEC551-8CDA-4EB6-89BB-2A86C9F091C8}" type="datetime8">
               <a:rPr lang="en-US" smtClean="0"/>
-              <a:t>3/27/2017 10:58 AM</a:t>
+              <a:t>3/30/2017 7:13 AM</a:t>
             </a:fld>
             <a:endParaRPr lang="en-US" dirty="0"/>
           </a:p>
@@ -1773,7 +1773,7 @@
           <a:p>
             <a:fld id="{38EEC551-8CDA-4EB6-89BB-2A86C9F091C8}" type="datetime8">
               <a:rPr lang="en-US" smtClean="0"/>
-              <a:t>3/27/2017 10:58 AM</a:t>
+              <a:t>3/30/2017 7:13 AM</a:t>
             </a:fld>
             <a:endParaRPr lang="en-US" dirty="0"/>
           </a:p>
@@ -2012,7 +2012,7 @@
           <a:p>
             <a:fld id="{38EEC551-8CDA-4EB6-89BB-2A86C9F091C8}" type="datetime8">
               <a:rPr lang="en-US" smtClean="0"/>
-              <a:t>3/27/2017 10:58 AM</a:t>
+              <a:t>3/30/2017 7:13 AM</a:t>
             </a:fld>
             <a:endParaRPr lang="en-US" dirty="0"/>
           </a:p>
@@ -2265,7 +2265,7 @@
           <a:p>
             <a:fld id="{38EEC551-8CDA-4EB6-89BB-2A86C9F091C8}" type="datetime8">
               <a:rPr lang="en-US" smtClean="0"/>
-              <a:t>3/27/2017 10:58 AM</a:t>
+              <a:t>3/30/2017 7:13 AM</a:t>
             </a:fld>
             <a:endParaRPr lang="en-US" dirty="0"/>
           </a:p>
@@ -2484,7 +2484,7 @@
           <a:p>
             <a:fld id="{38EEC551-8CDA-4EB6-89BB-2A86C9F091C8}" type="datetime8">
               <a:rPr lang="en-US" smtClean="0"/>
-              <a:t>3/27/2017 10:58 AM</a:t>
+              <a:t>3/30/2017 7:13 AM</a:t>
             </a:fld>
             <a:endParaRPr lang="en-US" dirty="0"/>
           </a:p>
@@ -2880,7 +2880,7 @@
           <a:p>
             <a:fld id="{38EEC551-8CDA-4EB6-89BB-2A86C9F091C8}" type="datetime8">
               <a:rPr lang="en-US" smtClean="0"/>
-              <a:t>3/27/2017 10:58 AM</a:t>
+              <a:t>3/30/2017 7:13 AM</a:t>
             </a:fld>
             <a:endParaRPr lang="en-US" dirty="0"/>
           </a:p>
@@ -3694,7 +3694,7 @@
           <a:p>
             <a:fld id="{38EEC551-8CDA-4EB6-89BB-2A86C9F091C8}" type="datetime8">
               <a:rPr lang="en-US" smtClean="0"/>
-              <a:t>3/27/2017 10:58 AM</a:t>
+              <a:t>3/30/2017 7:13 AM</a:t>
             </a:fld>
             <a:endParaRPr lang="en-US" dirty="0"/>
           </a:p>
@@ -4224,7 +4224,7 @@
           <a:p>
             <a:fld id="{38EEC551-8CDA-4EB6-89BB-2A86C9F091C8}" type="datetime8">
               <a:rPr lang="en-US" smtClean="0"/>
-              <a:t>3/27/2017 10:58 AM</a:t>
+              <a:t>3/30/2017 7:13 AM</a:t>
             </a:fld>
             <a:endParaRPr lang="en-US" dirty="0"/>
           </a:p>
@@ -4426,7 +4426,7 @@
           <a:p>
             <a:fld id="{38EEC551-8CDA-4EB6-89BB-2A86C9F091C8}" type="datetime8">
               <a:rPr lang="en-US" smtClean="0"/>
-              <a:t>3/27/2017 10:58 AM</a:t>
+              <a:t>3/30/2017 7:13 AM</a:t>
             </a:fld>
             <a:endParaRPr lang="en-US" dirty="0"/>
           </a:p>
@@ -4553,15 +4553,7 @@
           <a:p>
             <a:r>
               <a:rPr lang="en-US" baseline="0" dirty="0"/>
-              <a:t>What we have here is a snippet of an Azure Resource Manager (ARM) declaration for VMSS. It takes a reference to the Key Vault where the certificates are stored, and we then specify the individual certificates within that store we want, and where they should be placed on the VMSS instance. If you are doing this to a self-managed VM, you would simply install the certificate yourself using whatever approach you are most comfortable with. Be it an orchestrator like Chef </a:t>
-            </a:r>
-            <a:r>
-              <a:rPr lang="en-US" baseline="0"/>
-              <a:t>or Puppet, </a:t>
-            </a:r>
-            <a:r>
-              <a:rPr lang="en-US" baseline="0" dirty="0"/>
-              <a:t>remote </a:t>
+              <a:t>What we have here is a snippet of an Azure Resource Manager (ARM) declaration for VMSS. It takes a reference to the Key Vault where the certificates are stored, and we then specify the individual certificates within that store we want, and where they should be placed on the VMSS instance. If you are doing this to a self-managed VM, you would simply install the certificate yourself using whatever approach you are most comfortable with. Be it an orchestrator like Chef or Puppet, remote </a:t>
             </a:r>
             <a:r>
               <a:rPr lang="en-US" baseline="0" dirty="0" err="1"/>
@@ -4667,7 +4659,21 @@
           <a:p>
             <a:r>
               <a:rPr lang="en-US" dirty="0"/>
-              <a:t>https://docs.microsoft.com/en-us/azure/service-fabric/service-fabric-service-manifest-resources#example-specifying-an-https-endpoint-for-your-servicehttps://docs.microsoft.com/en-us/azure/service-fabric/service-fabric-cluster-security-update-certs-azure#adding-or-removing-client-certificates</a:t>
+              <a:t>https://docs.microsoft.com/en-us/azure/service-fabric/service-fabric-service-manifest-resources</a:t>
+            </a:r>
+            <a:r>
+              <a:rPr lang="en-US"/>
+              <a:t>#example-specifying-an-https-endpoint-for-your-service</a:t>
+            </a:r>
+          </a:p>
+          <a:p>
+            <a:r>
+              <a:rPr lang="en-US"/>
+              <a:t>https</a:t>
+            </a:r>
+            <a:r>
+              <a:rPr lang="en-US" dirty="0"/>
+              <a:t>://docs.microsoft.com/en-us/azure/service-fabric/service-fabric-cluster-security-update-certs-azure#adding-or-removing-client-certificates</a:t>
             </a:r>
           </a:p>
         </p:txBody>
@@ -4766,7 +4772,7 @@
           <a:p>
             <a:fld id="{38EEC551-8CDA-4EB6-89BB-2A86C9F091C8}" type="datetime8">
               <a:rPr lang="en-US" smtClean="0"/>
-              <a:t>3/27/2017 10:58 AM</a:t>
+              <a:t>3/30/2017 7:13 AM</a:t>
             </a:fld>
             <a:endParaRPr lang="en-US" dirty="0"/>
           </a:p>
@@ -5258,7 +5264,7 @@
           <a:p>
             <a:fld id="{38EEC551-8CDA-4EB6-89BB-2A86C9F091C8}" type="datetime8">
               <a:rPr lang="en-US" smtClean="0"/>
-              <a:t>3/27/2017 10:58 AM</a:t>
+              <a:t>3/30/2017 7:13 AM</a:t>
             </a:fld>
             <a:endParaRPr lang="en-US" dirty="0"/>
           </a:p>
@@ -5572,7 +5578,7 @@
           <a:p>
             <a:fld id="{38EEC551-8CDA-4EB6-89BB-2A86C9F091C8}" type="datetime8">
               <a:rPr lang="en-US" smtClean="0"/>
-              <a:t>3/27/2017 10:58 AM</a:t>
+              <a:t>3/30/2017 7:13 AM</a:t>
             </a:fld>
             <a:endParaRPr lang="en-US" dirty="0"/>
           </a:p>
@@ -6176,7 +6182,7 @@
           <a:p>
             <a:fld id="{38EEC551-8CDA-4EB6-89BB-2A86C9F091C8}" type="datetime8">
               <a:rPr lang="en-US" smtClean="0"/>
-              <a:t>3/27/2017 10:58 AM</a:t>
+              <a:t>3/30/2017 7:13 AM</a:t>
             </a:fld>
             <a:endParaRPr lang="en-US" dirty="0"/>
           </a:p>
@@ -6341,7 +6347,7 @@
           <a:p>
             <a:fld id="{6108602D-D426-4C00-B215-BFA18C076426}" type="datetime8">
               <a:rPr lang="en-US" smtClean="0"/>
-              <a:t>3/27/2017 10:58 AM</a:t>
+              <a:t>3/30/2017 7:14 AM</a:t>
             </a:fld>
             <a:endParaRPr lang="en-US" dirty="0"/>
           </a:p>
@@ -6628,7 +6634,7 @@
           <a:p>
             <a:fld id="{90EC29EE-A8AD-4CE0-9C0B-116E0D4D7533}" type="datetime8">
               <a:rPr lang="en-US" smtClean="0"/>
-              <a:t>3/27/2017 10:58 AM</a:t>
+              <a:t>3/30/2017 7:13 AM</a:t>
             </a:fld>
             <a:endParaRPr lang="en-US" dirty="0"/>
           </a:p>
@@ -6920,7 +6926,7 @@
                 <a:tabLst/>
                 <a:defRPr/>
               </a:pPr>
-              <a:t>3/27/2017 10:58 AM</a:t>
+              <a:t>3/30/2017 7:13 AM</a:t>
             </a:fld>
             <a:endParaRPr kumimoji="0" lang="en-US" sz="1800" b="0" i="0" u="none" strike="noStrike" kern="0" cap="none" spc="0" normalizeH="0" baseline="0" noProof="0" dirty="0">
               <a:ln>
@@ -7522,7 +7528,7 @@
           <a:p>
             <a:fld id="{38EEC551-8CDA-4EB6-89BB-2A86C9F091C8}" type="datetime8">
               <a:rPr lang="en-US" smtClean="0"/>
-              <a:t>3/27/2017 10:58 AM</a:t>
+              <a:t>3/30/2017 7:13 AM</a:t>
             </a:fld>
             <a:endParaRPr lang="en-US" dirty="0"/>
           </a:p>
@@ -7777,7 +7783,7 @@
           <a:p>
             <a:fld id="{38EEC551-8CDA-4EB6-89BB-2A86C9F091C8}" type="datetime8">
               <a:rPr lang="en-US" smtClean="0"/>
-              <a:t>3/27/2017 10:58 AM</a:t>
+              <a:t>3/30/2017 7:13 AM</a:t>
             </a:fld>
             <a:endParaRPr lang="en-US" dirty="0"/>
           </a:p>
@@ -7970,7 +7976,7 @@
           <a:p>
             <a:fld id="{38EEC551-8CDA-4EB6-89BB-2A86C9F091C8}" type="datetime8">
               <a:rPr lang="en-US" smtClean="0"/>
-              <a:t>3/27/2017 10:58 AM</a:t>
+              <a:t>3/30/2017 7:13 AM</a:t>
             </a:fld>
             <a:endParaRPr lang="en-US" dirty="0"/>
           </a:p>
@@ -8260,7 +8266,7 @@
           <a:p>
             <a:fld id="{38EEC551-8CDA-4EB6-89BB-2A86C9F091C8}" type="datetime8">
               <a:rPr lang="en-US" smtClean="0"/>
-              <a:t>3/27/2017 10:58 AM</a:t>
+              <a:t>3/30/2017 7:13 AM</a:t>
             </a:fld>
             <a:endParaRPr lang="en-US" dirty="0"/>
           </a:p>
@@ -23394,6 +23400,36 @@
           </a:p>
         </p:txBody>
       </p:sp>
+      <p:sp>
+        <p:nvSpPr>
+          <p:cNvPr id="6" name="Rectangle 5"/>
+          <p:cNvSpPr/>
+          <p:nvPr/>
+        </p:nvSpPr>
+        <p:spPr>
+          <a:xfrm>
+            <a:off x="5192857" y="6359852"/>
+            <a:ext cx="7121380" cy="523220"/>
+          </a:xfrm>
+          <a:prstGeom prst="rect">
+            <a:avLst/>
+          </a:prstGeom>
+        </p:spPr>
+        <p:txBody>
+          <a:bodyPr wrap="square">
+            <a:spAutoFit/>
+          </a:bodyPr>
+          <a:lstStyle/>
+          <a:p>
+            <a:pPr algn="r"/>
+            <a:r>
+              <a:rPr lang="en-US" sz="2800" b="1" dirty="0"/>
+              <a:t>https://aka.ms/brent-servicefabric</a:t>
+            </a:r>
+            <a:endParaRPr lang="en-US" sz="1600" dirty="0"/>
+          </a:p>
+        </p:txBody>
+      </p:sp>
     </p:spTree>
     <p:extLst>
       <p:ext uri="{BB962C8B-B14F-4D97-AF65-F5344CB8AC3E}">
@@ -24363,7 +24399,7 @@
         <p:spPr>
           <a:xfrm>
             <a:off x="274638" y="1221157"/>
-            <a:ext cx="5727443" cy="3139321"/>
+            <a:ext cx="5727443" cy="3237809"/>
           </a:xfrm>
         </p:spPr>
         <p:txBody>
@@ -24419,6 +24455,19 @@
                 <a:cs typeface="Arial" panose="020B0604020202020204" pitchFamily="34" charset="0"/>
               </a:rPr>
               <a:t>Private IP w/ Load balancer</a:t>
+            </a:r>
+          </a:p>
+          <a:p>
+            <a:pPr marL="571500" indent="-571500">
+              <a:buFont typeface="Arial" panose="020B0604020202020204" pitchFamily="34" charset="0"/>
+              <a:buChar char="•"/>
+            </a:pPr>
+            <a:r>
+              <a:rPr lang="en-US" sz="3200" dirty="0">
+                <a:latin typeface="+mn-lt"/>
+                <a:cs typeface="Arial" panose="020B0604020202020204" pitchFamily="34" charset="0"/>
+              </a:rPr>
+              <a:t>Fabric services isolated from application services</a:t>
             </a:r>
           </a:p>
         </p:txBody>
@@ -26822,7 +26871,11 @@
           <a:lstStyle/>
           <a:p>
             <a:r>
-              <a:rPr lang="en-US" dirty="0"/>
+              <a:rPr lang="en-US" dirty="0">
+                <a:solidFill>
+                  <a:schemeClr val="bg1"/>
+                </a:solidFill>
+              </a:rPr>
               <a:t>Service Port Assignment</a:t>
             </a:r>
           </a:p>
@@ -26854,6 +26907,9 @@
             </a:pPr>
             <a:r>
               <a:rPr lang="en-US" sz="3200" dirty="0">
+                <a:solidFill>
+                  <a:schemeClr val="bg1"/>
+                </a:solidFill>
                 <a:latin typeface="+mn-lt"/>
               </a:rPr>
               <a:t>Endpoints are declared in the service manifest</a:t>
@@ -26866,6 +26922,9 @@
             </a:pPr>
             <a:r>
               <a:rPr lang="en-US" sz="3200" dirty="0">
+                <a:solidFill>
+                  <a:schemeClr val="bg1"/>
+                </a:solidFill>
                 <a:latin typeface="+mn-lt"/>
               </a:rPr>
               <a:t>The “Port” is optional</a:t>
@@ -26889,8 +26948,8 @@
         </p:blipFill>
         <p:spPr>
           <a:xfrm>
-            <a:off x="274638" y="2651164"/>
-            <a:ext cx="7394729" cy="2996811"/>
+            <a:off x="274637" y="2430462"/>
+            <a:ext cx="7897092" cy="3200400"/>
           </a:xfrm>
           <a:prstGeom prst="rect">
             <a:avLst/>
@@ -26905,8 +26964,8 @@
         </p:nvSpPr>
         <p:spPr>
           <a:xfrm>
-            <a:off x="7774544" y="2651164"/>
-            <a:ext cx="4681298" cy="2806922"/>
+            <a:off x="8123237" y="1745532"/>
+            <a:ext cx="4681298" cy="3083921"/>
           </a:xfrm>
           <a:prstGeom prst="rect">
             <a:avLst/>
@@ -26929,19 +26988,11 @@
             </a:pPr>
             <a:r>
               <a:rPr lang="en-US" sz="2400" dirty="0">
-                <a:gradFill>
-                  <a:gsLst>
-                    <a:gs pos="2917">
-                      <a:schemeClr val="tx1"/>
-                    </a:gs>
-                    <a:gs pos="30000">
-                      <a:schemeClr val="tx1"/>
-                    </a:gs>
-                  </a:gsLst>
-                  <a:lin ang="5400000" scaled="0"/>
-                </a:gradFill>
+                <a:solidFill>
+                  <a:schemeClr val="bg1"/>
+                </a:solidFill>
               </a:rPr>
-              <a:t>Benefits of Fabric Assigned Port</a:t>
+              <a:t>Benefits</a:t>
             </a:r>
           </a:p>
           <a:p>
@@ -26957,17 +27008,9 @@
             </a:pPr>
             <a:r>
               <a:rPr lang="en-US" sz="2000" dirty="0">
-                <a:gradFill>
-                  <a:gsLst>
-                    <a:gs pos="2917">
-                      <a:schemeClr val="tx1"/>
-                    </a:gs>
-                    <a:gs pos="30000">
-                      <a:schemeClr val="tx1"/>
-                    </a:gs>
-                  </a:gsLst>
-                  <a:lin ang="5400000" scaled="0"/>
-                </a:gradFill>
+                <a:solidFill>
+                  <a:schemeClr val="bg1"/>
+                </a:solidFill>
               </a:rPr>
               <a:t>Use cluster’s application range</a:t>
             </a:r>
@@ -26985,17 +27028,9 @@
             </a:pPr>
             <a:r>
               <a:rPr lang="en-US" sz="2000" dirty="0">
-                <a:gradFill>
-                  <a:gsLst>
-                    <a:gs pos="2917">
-                      <a:schemeClr val="tx1"/>
-                    </a:gs>
-                    <a:gs pos="30000">
-                      <a:schemeClr val="tx1"/>
-                    </a:gs>
-                  </a:gsLst>
-                  <a:lin ang="5400000" scaled="0"/>
-                </a:gradFill>
+                <a:solidFill>
+                  <a:schemeClr val="bg1"/>
+                </a:solidFill>
               </a:rPr>
               <a:t>Avoids port collisions</a:t>
             </a:r>
@@ -27012,17 +27047,9 @@
               <a:buChar char="-"/>
             </a:pPr>
             <a:endParaRPr lang="en-US" sz="2000" dirty="0">
-              <a:gradFill>
-                <a:gsLst>
-                  <a:gs pos="2917">
-                    <a:schemeClr val="tx1"/>
-                  </a:gs>
-                  <a:gs pos="30000">
-                    <a:schemeClr val="tx1"/>
-                  </a:gs>
-                </a:gsLst>
-                <a:lin ang="5400000" scaled="0"/>
-              </a:gradFill>
+              <a:solidFill>
+                <a:schemeClr val="bg1"/>
+              </a:solidFill>
             </a:endParaRPr>
           </a:p>
           <a:p>
@@ -27036,19 +27063,11 @@
             </a:pPr>
             <a:r>
               <a:rPr lang="en-US" sz="2000" dirty="0">
-                <a:gradFill>
-                  <a:gsLst>
-                    <a:gs pos="2917">
-                      <a:schemeClr val="tx1"/>
-                    </a:gs>
-                    <a:gs pos="30000">
-                      <a:schemeClr val="tx1"/>
-                    </a:gs>
-                  </a:gsLst>
-                  <a:lin ang="5400000" scaled="0"/>
-                </a:gradFill>
+                <a:solidFill>
+                  <a:schemeClr val="bg1"/>
+                </a:solidFill>
               </a:rPr>
-              <a:t>Resolve via the naming service</a:t>
+              <a:t>Resolve via the Reverse proxy or Naming service</a:t>
             </a:r>
           </a:p>
           <a:p>
@@ -27063,17 +27082,9 @@
               <a:buChar char="-"/>
             </a:pPr>
             <a:endParaRPr lang="en-US" sz="2000" dirty="0">
-              <a:gradFill>
-                <a:gsLst>
-                  <a:gs pos="2917">
-                    <a:schemeClr val="tx1"/>
-                  </a:gs>
-                  <a:gs pos="30000">
-                    <a:schemeClr val="tx1"/>
-                  </a:gs>
-                </a:gsLst>
-                <a:lin ang="5400000" scaled="0"/>
-              </a:gradFill>
+              <a:solidFill>
+                <a:schemeClr val="bg1"/>
+              </a:solidFill>
             </a:endParaRPr>
           </a:p>
           <a:p>
@@ -27088,17 +27099,9 @@
               <a:buChar char="-"/>
             </a:pPr>
             <a:endParaRPr lang="en-US" sz="2400" dirty="0">
-              <a:gradFill>
-                <a:gsLst>
-                  <a:gs pos="2917">
-                    <a:schemeClr val="tx1"/>
-                  </a:gs>
-                  <a:gs pos="30000">
-                    <a:schemeClr val="tx1"/>
-                  </a:gs>
-                </a:gsLst>
-                <a:lin ang="5400000" scaled="0"/>
-              </a:gradFill>
+              <a:solidFill>
+                <a:schemeClr val="bg1"/>
+              </a:solidFill>
             </a:endParaRPr>
           </a:p>
         </p:txBody>
@@ -27111,8 +27114,8 @@
         </p:nvGrpSpPr>
         <p:grpSpPr>
           <a:xfrm>
-            <a:off x="5595620" y="5097462"/>
-            <a:ext cx="6543675" cy="1495425"/>
+            <a:off x="1951036" y="4106862"/>
+            <a:ext cx="10188259" cy="2486025"/>
             <a:chOff x="5595620" y="5097462"/>
             <a:chExt cx="6543675" cy="1495425"/>
           </a:xfrm>
@@ -27208,17 +27211,9 @@
                 </a:spcAft>
               </a:pPr>
               <a:endParaRPr lang="en-US" sz="2400" dirty="0" err="1">
-                <a:gradFill>
-                  <a:gsLst>
-                    <a:gs pos="0">
-                      <a:srgbClr val="FFFFFF"/>
-                    </a:gs>
-                    <a:gs pos="100000">
-                      <a:srgbClr val="FFFFFF"/>
-                    </a:gs>
-                  </a:gsLst>
-                  <a:lin ang="5400000" scaled="0"/>
-                </a:gradFill>
+                <a:solidFill>
+                  <a:schemeClr val="bg1"/>
+                </a:solidFill>
                 <a:ea typeface="Segoe UI" pitchFamily="34" charset="0"/>
                 <a:cs typeface="Segoe UI" pitchFamily="34" charset="0"/>
               </a:endParaRPr>
@@ -28124,6 +28119,30 @@
           <a:chExt cx="0" cy="0"/>
         </a:xfrm>
       </p:grpSpPr>
+      <p:pic>
+        <p:nvPicPr>
+          <p:cNvPr id="11" name="Picture 10"/>
+          <p:cNvPicPr>
+            <a:picLocks noChangeAspect="1"/>
+          </p:cNvPicPr>
+          <p:nvPr/>
+        </p:nvPicPr>
+        <p:blipFill>
+          <a:blip r:embed="rId3"/>
+          <a:stretch>
+            <a:fillRect/>
+          </a:stretch>
+        </p:blipFill>
+        <p:spPr>
+          <a:xfrm>
+            <a:off x="1646237" y="2796329"/>
+            <a:ext cx="8771909" cy="3802159"/>
+          </a:xfrm>
+          <a:prstGeom prst="rect">
+            <a:avLst/>
+          </a:prstGeom>
+        </p:spPr>
+      </p:pic>
       <p:sp>
         <p:nvSpPr>
           <p:cNvPr id="2" name="Title 1"/>
@@ -28512,15 +28531,15 @@
           <p:nvPr/>
         </p:nvPicPr>
         <p:blipFill>
-          <a:blip r:embed="rId3"/>
+          <a:blip r:embed="rId4"/>
           <a:stretch>
             <a:fillRect/>
           </a:stretch>
         </p:blipFill>
         <p:spPr>
           <a:xfrm>
-            <a:off x="1112837" y="4697409"/>
-            <a:ext cx="10643410" cy="1960939"/>
+            <a:off x="288015" y="4335462"/>
+            <a:ext cx="13855021" cy="2552645"/>
           </a:xfrm>
           <a:prstGeom prst="rect">
             <a:avLst/>
@@ -28535,8 +28554,8 @@
         </p:nvSpPr>
         <p:spPr bwMode="auto">
           <a:xfrm>
-            <a:off x="1348192" y="5393459"/>
-            <a:ext cx="6394045" cy="321913"/>
+            <a:off x="523371" y="5268095"/>
+            <a:ext cx="8361866" cy="362767"/>
           </a:xfrm>
           <a:prstGeom prst="rect">
             <a:avLst/>
@@ -28611,8 +28630,8 @@
         </p:nvSpPr>
         <p:spPr bwMode="auto">
           <a:xfrm>
-            <a:off x="1265237" y="6099489"/>
-            <a:ext cx="10287000" cy="321913"/>
+            <a:off x="525865" y="6216699"/>
+            <a:ext cx="11695164" cy="362767"/>
           </a:xfrm>
           <a:prstGeom prst="rect">
             <a:avLst/>
@@ -28679,30 +28698,6 @@
           </a:p>
         </p:txBody>
       </p:sp>
-      <p:pic>
-        <p:nvPicPr>
-          <p:cNvPr id="11" name="Picture 10"/>
-          <p:cNvPicPr>
-            <a:picLocks noChangeAspect="1"/>
-          </p:cNvPicPr>
-          <p:nvPr/>
-        </p:nvPicPr>
-        <p:blipFill>
-          <a:blip r:embed="rId4"/>
-          <a:stretch>
-            <a:fillRect/>
-          </a:stretch>
-        </p:blipFill>
-        <p:spPr>
-          <a:xfrm>
-            <a:off x="1646237" y="2796329"/>
-            <a:ext cx="8771909" cy="3802159"/>
-          </a:xfrm>
-          <a:prstGeom prst="rect">
-            <a:avLst/>
-          </a:prstGeom>
-        </p:spPr>
-      </p:pic>
     </p:spTree>
     <p:extLst>
       <p:ext uri="{BB962C8B-B14F-4D97-AF65-F5344CB8AC3E}">
@@ -30665,7 +30660,7 @@
         <p:spPr>
           <a:xfrm>
             <a:off x="504032" y="4034834"/>
-            <a:ext cx="5486399" cy="2926955"/>
+            <a:ext cx="5486399" cy="2012859"/>
           </a:xfrm>
           <a:prstGeom prst="rect">
             <a:avLst/>
@@ -30710,7 +30705,15 @@
             <a:pPr algn="r"/>
             <a:r>
               <a:rPr lang="en-US" dirty="0"/>
-              <a:t>Zero Downtime Upgrade</a:t>
+              <a:t>Live, </a:t>
+            </a:r>
+            <a:r>
+              <a:rPr lang="en-US" dirty="0" err="1"/>
+              <a:t>Inplace</a:t>
+            </a:r>
+            <a:r>
+              <a:rPr lang="en-US" dirty="0"/>
+              <a:t> Upgrade</a:t>
             </a:r>
           </a:p>
         </p:txBody>
@@ -31262,6 +31265,36 @@
               </a:rPr>
               <a:t>http://brentdacodemonkey.wordpress.com</a:t>
             </a:r>
+          </a:p>
+        </p:txBody>
+      </p:sp>
+      <p:sp>
+        <p:nvSpPr>
+          <p:cNvPr id="9" name="Rectangle 8"/>
+          <p:cNvSpPr/>
+          <p:nvPr/>
+        </p:nvSpPr>
+        <p:spPr>
+          <a:xfrm>
+            <a:off x="5269057" y="2242"/>
+            <a:ext cx="7121380" cy="523220"/>
+          </a:xfrm>
+          <a:prstGeom prst="rect">
+            <a:avLst/>
+          </a:prstGeom>
+        </p:spPr>
+        <p:txBody>
+          <a:bodyPr wrap="square">
+            <a:spAutoFit/>
+          </a:bodyPr>
+          <a:lstStyle/>
+          <a:p>
+            <a:pPr algn="r"/>
+            <a:r>
+              <a:rPr lang="en-US" sz="2800" b="1" dirty="0"/>
+              <a:t>https://aka.ms/brent-servicefabric</a:t>
+            </a:r>
+            <a:endParaRPr lang="en-US" sz="1600" dirty="0"/>
           </a:p>
         </p:txBody>
       </p:sp>
@@ -32182,31 +32215,11 @@
           <a:prstGeom prst="rect">
             <a:avLst/>
           </a:prstGeom>
-          <a:gradFill flip="none" rotWithShape="1">
-            <a:gsLst>
-              <a:gs pos="0">
-                <a:schemeClr val="accent5">
-                  <a:lumMod val="40000"/>
-                  <a:lumOff val="60000"/>
-                </a:schemeClr>
-              </a:gs>
-              <a:gs pos="46000">
-                <a:schemeClr val="accent5">
-                  <a:lumMod val="95000"/>
-                  <a:lumOff val="5000"/>
-                </a:schemeClr>
-              </a:gs>
-              <a:gs pos="100000">
-                <a:schemeClr val="accent5">
-                  <a:lumMod val="60000"/>
-                </a:schemeClr>
-              </a:gs>
-            </a:gsLst>
-            <a:path path="circle">
-              <a:fillToRect l="50000" t="130000" r="50000" b="-30000"/>
-            </a:path>
-            <a:tileRect/>
-          </a:gradFill>
+          <a:solidFill>
+            <a:schemeClr val="tx1">
+              <a:lumMod val="75000"/>
+            </a:schemeClr>
+          </a:solidFill>
           <a:ln w="19050" cap="flat" cmpd="sng" algn="ctr">
             <a:solidFill>
               <a:schemeClr val="tx1"/>
@@ -32500,34 +32513,12 @@
           <a:prstGeom prst="rect">
             <a:avLst/>
           </a:prstGeom>
-          <a:gradFill flip="none" rotWithShape="1">
-            <a:gsLst>
-              <a:gs pos="0">
-                <a:schemeClr val="accent4">
-                  <a:lumMod val="89000"/>
-                </a:schemeClr>
-              </a:gs>
-              <a:gs pos="23000">
-                <a:schemeClr val="accent4">
-                  <a:lumMod val="89000"/>
-                </a:schemeClr>
-              </a:gs>
-              <a:gs pos="69000">
-                <a:schemeClr val="accent4">
-                  <a:lumMod val="75000"/>
-                </a:schemeClr>
-              </a:gs>
-              <a:gs pos="97000">
-                <a:schemeClr val="accent4">
-                  <a:lumMod val="70000"/>
-                </a:schemeClr>
-              </a:gs>
-            </a:gsLst>
-            <a:path path="circle">
-              <a:fillToRect l="50000" t="50000" r="50000" b="50000"/>
-            </a:path>
-            <a:tileRect/>
-          </a:gradFill>
+          <a:solidFill>
+            <a:schemeClr val="tx1">
+              <a:lumMod val="60000"/>
+              <a:lumOff val="40000"/>
+            </a:schemeClr>
+          </a:solidFill>
           <a:ln w="19050" cap="flat" cmpd="sng" algn="ctr">
             <a:solidFill>
               <a:schemeClr val="tx1"/>
@@ -32821,34 +32812,12 @@
           <a:prstGeom prst="rect">
             <a:avLst/>
           </a:prstGeom>
-          <a:gradFill flip="none" rotWithShape="1">
-            <a:gsLst>
-              <a:gs pos="0">
-                <a:schemeClr val="accent4">
-                  <a:lumMod val="89000"/>
-                </a:schemeClr>
-              </a:gs>
-              <a:gs pos="23000">
-                <a:schemeClr val="accent4">
-                  <a:lumMod val="89000"/>
-                </a:schemeClr>
-              </a:gs>
-              <a:gs pos="69000">
-                <a:schemeClr val="accent4">
-                  <a:lumMod val="75000"/>
-                </a:schemeClr>
-              </a:gs>
-              <a:gs pos="97000">
-                <a:schemeClr val="accent4">
-                  <a:lumMod val="70000"/>
-                </a:schemeClr>
-              </a:gs>
-            </a:gsLst>
-            <a:path path="circle">
-              <a:fillToRect l="50000" t="50000" r="50000" b="50000"/>
-            </a:path>
-            <a:tileRect/>
-          </a:gradFill>
+          <a:solidFill>
+            <a:schemeClr val="tx1">
+              <a:lumMod val="60000"/>
+              <a:lumOff val="40000"/>
+            </a:schemeClr>
+          </a:solidFill>
           <a:ln w="19050" cap="flat" cmpd="sng" algn="ctr">
             <a:solidFill>
               <a:schemeClr val="tx1"/>
@@ -33142,34 +33111,12 @@
           <a:prstGeom prst="rect">
             <a:avLst/>
           </a:prstGeom>
-          <a:gradFill flip="none" rotWithShape="1">
-            <a:gsLst>
-              <a:gs pos="0">
-                <a:schemeClr val="accent4">
-                  <a:lumMod val="89000"/>
-                </a:schemeClr>
-              </a:gs>
-              <a:gs pos="23000">
-                <a:schemeClr val="accent4">
-                  <a:lumMod val="89000"/>
-                </a:schemeClr>
-              </a:gs>
-              <a:gs pos="69000">
-                <a:schemeClr val="accent4">
-                  <a:lumMod val="75000"/>
-                </a:schemeClr>
-              </a:gs>
-              <a:gs pos="97000">
-                <a:schemeClr val="accent4">
-                  <a:lumMod val="70000"/>
-                </a:schemeClr>
-              </a:gs>
-            </a:gsLst>
-            <a:path path="circle">
-              <a:fillToRect l="50000" t="50000" r="50000" b="50000"/>
-            </a:path>
-            <a:tileRect/>
-          </a:gradFill>
+          <a:solidFill>
+            <a:schemeClr val="tx1">
+              <a:lumMod val="60000"/>
+              <a:lumOff val="40000"/>
+            </a:schemeClr>
+          </a:solidFill>
           <a:ln w="19050" cap="flat" cmpd="sng" algn="ctr">
             <a:solidFill>
               <a:schemeClr val="tx1"/>
@@ -33463,34 +33410,12 @@
           <a:prstGeom prst="rect">
             <a:avLst/>
           </a:prstGeom>
-          <a:gradFill flip="none" rotWithShape="1">
-            <a:gsLst>
-              <a:gs pos="0">
-                <a:schemeClr val="accent4">
-                  <a:lumMod val="89000"/>
-                </a:schemeClr>
-              </a:gs>
-              <a:gs pos="23000">
-                <a:schemeClr val="accent4">
-                  <a:lumMod val="89000"/>
-                </a:schemeClr>
-              </a:gs>
-              <a:gs pos="69000">
-                <a:schemeClr val="accent4">
-                  <a:lumMod val="75000"/>
-                </a:schemeClr>
-              </a:gs>
-              <a:gs pos="97000">
-                <a:schemeClr val="accent4">
-                  <a:lumMod val="70000"/>
-                </a:schemeClr>
-              </a:gs>
-            </a:gsLst>
-            <a:path path="circle">
-              <a:fillToRect l="50000" t="50000" r="50000" b="50000"/>
-            </a:path>
-            <a:tileRect/>
-          </a:gradFill>
+          <a:solidFill>
+            <a:schemeClr val="tx1">
+              <a:lumMod val="60000"/>
+              <a:lumOff val="40000"/>
+            </a:schemeClr>
+          </a:solidFill>
           <a:ln w="19050" cap="flat" cmpd="sng" algn="ctr">
             <a:solidFill>
               <a:schemeClr val="tx1"/>
@@ -33784,34 +33709,12 @@
           <a:prstGeom prst="rect">
             <a:avLst/>
           </a:prstGeom>
-          <a:gradFill flip="none" rotWithShape="1">
-            <a:gsLst>
-              <a:gs pos="0">
-                <a:schemeClr val="accent4">
-                  <a:lumMod val="89000"/>
-                </a:schemeClr>
-              </a:gs>
-              <a:gs pos="23000">
-                <a:schemeClr val="accent4">
-                  <a:lumMod val="89000"/>
-                </a:schemeClr>
-              </a:gs>
-              <a:gs pos="69000">
-                <a:schemeClr val="accent4">
-                  <a:lumMod val="75000"/>
-                </a:schemeClr>
-              </a:gs>
-              <a:gs pos="97000">
-                <a:schemeClr val="accent4">
-                  <a:lumMod val="70000"/>
-                </a:schemeClr>
-              </a:gs>
-            </a:gsLst>
-            <a:path path="circle">
-              <a:fillToRect l="50000" t="50000" r="50000" b="50000"/>
-            </a:path>
-            <a:tileRect/>
-          </a:gradFill>
+          <a:solidFill>
+            <a:schemeClr val="tx1">
+              <a:lumMod val="60000"/>
+              <a:lumOff val="40000"/>
+            </a:schemeClr>
+          </a:solidFill>
           <a:ln w="19050" cap="flat" cmpd="sng" algn="ctr">
             <a:solidFill>
               <a:schemeClr val="tx1"/>
@@ -34251,34 +34154,11 @@
           <a:prstGeom prst="rect">
             <a:avLst/>
           </a:prstGeom>
-          <a:gradFill flip="none" rotWithShape="1">
-            <a:gsLst>
-              <a:gs pos="0">
-                <a:schemeClr val="accent4">
-                  <a:lumMod val="89000"/>
-                </a:schemeClr>
-              </a:gs>
-              <a:gs pos="23000">
-                <a:schemeClr val="accent4">
-                  <a:lumMod val="89000"/>
-                </a:schemeClr>
-              </a:gs>
-              <a:gs pos="69000">
-                <a:schemeClr val="accent4">
-                  <a:lumMod val="75000"/>
-                </a:schemeClr>
-              </a:gs>
-              <a:gs pos="97000">
-                <a:schemeClr val="accent4">
-                  <a:lumMod val="70000"/>
-                </a:schemeClr>
-              </a:gs>
-            </a:gsLst>
-            <a:path path="circle">
-              <a:fillToRect l="50000" t="50000" r="50000" b="50000"/>
-            </a:path>
-            <a:tileRect/>
-          </a:gradFill>
+          <a:solidFill>
+            <a:schemeClr val="tx1">
+              <a:lumMod val="75000"/>
+            </a:schemeClr>
+          </a:solidFill>
           <a:ln w="19050" cap="flat" cmpd="sng" algn="ctr">
             <a:solidFill>
               <a:schemeClr val="tx1"/>
@@ -34383,34 +34263,11 @@
           <a:prstGeom prst="rect">
             <a:avLst/>
           </a:prstGeom>
-          <a:gradFill flip="none" rotWithShape="1">
-            <a:gsLst>
-              <a:gs pos="0">
-                <a:schemeClr val="accent4">
-                  <a:lumMod val="89000"/>
-                </a:schemeClr>
-              </a:gs>
-              <a:gs pos="23000">
-                <a:schemeClr val="accent4">
-                  <a:lumMod val="89000"/>
-                </a:schemeClr>
-              </a:gs>
-              <a:gs pos="69000">
-                <a:schemeClr val="accent4">
-                  <a:lumMod val="75000"/>
-                </a:schemeClr>
-              </a:gs>
-              <a:gs pos="97000">
-                <a:schemeClr val="accent4">
-                  <a:lumMod val="70000"/>
-                </a:schemeClr>
-              </a:gs>
-            </a:gsLst>
-            <a:path path="circle">
-              <a:fillToRect l="50000" t="50000" r="50000" b="50000"/>
-            </a:path>
-            <a:tileRect/>
-          </a:gradFill>
+          <a:solidFill>
+            <a:schemeClr val="tx1">
+              <a:lumMod val="75000"/>
+            </a:schemeClr>
+          </a:solidFill>
           <a:ln w="19050" cap="flat" cmpd="sng" algn="ctr">
             <a:solidFill>
               <a:schemeClr val="tx1"/>
@@ -36040,6 +35897,216 @@
           </a:p>
         </p:txBody>
       </p:sp>
+      <p:sp>
+        <p:nvSpPr>
+          <p:cNvPr id="3" name="TextBox 2"/>
+          <p:cNvSpPr txBox="1"/>
+          <p:nvPr/>
+        </p:nvSpPr>
+        <p:spPr>
+          <a:xfrm>
+            <a:off x="258990" y="3344862"/>
+            <a:ext cx="11717790" cy="2576090"/>
+          </a:xfrm>
+          <a:prstGeom prst="rect">
+            <a:avLst/>
+          </a:prstGeom>
+          <a:noFill/>
+        </p:spPr>
+        <p:txBody>
+          <a:bodyPr wrap="square" lIns="182880" tIns="146304" rIns="182880" bIns="146304" rtlCol="0">
+            <a:spAutoFit/>
+          </a:bodyPr>
+          <a:lstStyle/>
+          <a:p>
+            <a:pPr>
+              <a:lnSpc>
+                <a:spcPct val="90000"/>
+              </a:lnSpc>
+              <a:spcAft>
+                <a:spcPts val="600"/>
+              </a:spcAft>
+            </a:pPr>
+            <a:r>
+              <a:rPr lang="en-US" sz="3600" dirty="0">
+                <a:solidFill>
+                  <a:schemeClr val="accent2">
+                    <a:lumMod val="50000"/>
+                    <a:lumOff val="50000"/>
+                  </a:schemeClr>
+                </a:solidFill>
+              </a:rPr>
+              <a:t>Grouped into Node Types</a:t>
+            </a:r>
+          </a:p>
+          <a:p>
+            <a:pPr>
+              <a:lnSpc>
+                <a:spcPct val="90000"/>
+              </a:lnSpc>
+              <a:spcAft>
+                <a:spcPts val="600"/>
+              </a:spcAft>
+            </a:pPr>
+            <a:r>
+              <a:rPr lang="en-US" sz="2800" dirty="0">
+                <a:gradFill>
+                  <a:gsLst>
+                    <a:gs pos="2917">
+                      <a:schemeClr val="tx1"/>
+                    </a:gs>
+                    <a:gs pos="30000">
+                      <a:schemeClr val="tx1"/>
+                    </a:gs>
+                  </a:gsLst>
+                  <a:lin ang="5400000" scaled="0"/>
+                </a:gradFill>
+              </a:rPr>
+              <a:t>A “node type” is a group of nodes with similar properties. </a:t>
+            </a:r>
+          </a:p>
+          <a:p>
+            <a:pPr>
+              <a:lnSpc>
+                <a:spcPct val="90000"/>
+              </a:lnSpc>
+              <a:spcAft>
+                <a:spcPts val="600"/>
+              </a:spcAft>
+            </a:pPr>
+            <a:endParaRPr lang="en-US" sz="2800" dirty="0">
+              <a:gradFill>
+                <a:gsLst>
+                  <a:gs pos="2917">
+                    <a:schemeClr val="tx1"/>
+                  </a:gs>
+                  <a:gs pos="30000">
+                    <a:schemeClr val="tx1"/>
+                  </a:gs>
+                </a:gsLst>
+                <a:lin ang="5400000" scaled="0"/>
+              </a:gradFill>
+            </a:endParaRPr>
+          </a:p>
+          <a:p>
+            <a:pPr>
+              <a:lnSpc>
+                <a:spcPct val="90000"/>
+              </a:lnSpc>
+              <a:spcAft>
+                <a:spcPts val="600"/>
+              </a:spcAft>
+            </a:pPr>
+            <a:r>
+              <a:rPr lang="en-US" sz="2800" dirty="0">
+                <a:gradFill>
+                  <a:gsLst>
+                    <a:gs pos="2917">
+                      <a:schemeClr val="tx1"/>
+                    </a:gs>
+                    <a:gs pos="30000">
+                      <a:schemeClr val="tx1"/>
+                    </a:gs>
+                  </a:gsLst>
+                  <a:lin ang="5400000" scaled="0"/>
+                </a:gradFill>
+              </a:rPr>
+              <a:t>Describes “nature” of nodes for service fabric. Capacity and placement properties, </a:t>
+            </a:r>
+            <a:r>
+              <a:rPr lang="en-US" sz="2800" dirty="0" err="1">
+                <a:gradFill>
+                  <a:gsLst>
+                    <a:gs pos="2917">
+                      <a:schemeClr val="tx1"/>
+                    </a:gs>
+                    <a:gs pos="30000">
+                      <a:schemeClr val="tx1"/>
+                    </a:gs>
+                  </a:gsLst>
+                  <a:lin ang="5400000" scaled="0"/>
+                </a:gradFill>
+              </a:rPr>
+              <a:t>etc</a:t>
+            </a:r>
+            <a:endParaRPr lang="en-US" sz="2800" dirty="0">
+              <a:gradFill>
+                <a:gsLst>
+                  <a:gs pos="2917">
+                    <a:schemeClr val="tx1"/>
+                  </a:gs>
+                  <a:gs pos="30000">
+                    <a:schemeClr val="tx1"/>
+                  </a:gs>
+                </a:gsLst>
+                <a:lin ang="5400000" scaled="0"/>
+              </a:gradFill>
+            </a:endParaRPr>
+          </a:p>
+        </p:txBody>
+      </p:sp>
+      <p:sp>
+        <p:nvSpPr>
+          <p:cNvPr id="7" name="Rectangle 6"/>
+          <p:cNvSpPr/>
+          <p:nvPr/>
+        </p:nvSpPr>
+        <p:spPr>
+          <a:xfrm>
+            <a:off x="427039" y="1492926"/>
+            <a:ext cx="10401463" cy="2185214"/>
+          </a:xfrm>
+          <a:prstGeom prst="rect">
+            <a:avLst/>
+          </a:prstGeom>
+        </p:spPr>
+        <p:txBody>
+          <a:bodyPr wrap="square">
+            <a:spAutoFit/>
+          </a:bodyPr>
+          <a:lstStyle/>
+          <a:p>
+            <a:r>
+              <a:rPr lang="en-US" sz="4000" dirty="0">
+                <a:solidFill>
+                  <a:schemeClr val="accent2">
+                    <a:lumMod val="50000"/>
+                    <a:lumOff val="50000"/>
+                  </a:schemeClr>
+                </a:solidFill>
+              </a:rPr>
+              <a:t>A single server instance (physical or virtual)</a:t>
+            </a:r>
+          </a:p>
+          <a:p>
+            <a:pPr marL="571500" indent="-571500">
+              <a:buFont typeface="Arial" panose="020B0604020202020204" pitchFamily="34" charset="0"/>
+              <a:buChar char="•"/>
+            </a:pPr>
+            <a:r>
+              <a:rPr lang="en-US" sz="3200" dirty="0"/>
+              <a:t>Is a host for Service Fabric managed processes</a:t>
+            </a:r>
+          </a:p>
+          <a:p>
+            <a:pPr marL="571500" indent="-571500">
+              <a:buFont typeface="Arial" panose="020B0604020202020204" pitchFamily="34" charset="0"/>
+              <a:buChar char="•"/>
+            </a:pPr>
+            <a:r>
+              <a:rPr lang="en-US" sz="3200" dirty="0"/>
+              <a:t>Contains code and configuration</a:t>
+            </a:r>
+          </a:p>
+          <a:p>
+            <a:pPr marL="571500" indent="-571500">
+              <a:buFont typeface="Arial" panose="020B0604020202020204" pitchFamily="34" charset="0"/>
+              <a:buChar char="•"/>
+            </a:pPr>
+            <a:endParaRPr lang="en-US" sz="3200" dirty="0"/>
+          </a:p>
+        </p:txBody>
+      </p:sp>
       <p:pic>
         <p:nvPicPr>
           <p:cNvPr id="2" name="Picture 1"/>
@@ -36056,198 +36123,14 @@
         </p:blipFill>
         <p:spPr>
           <a:xfrm>
-            <a:off x="6719559" y="3465774"/>
-            <a:ext cx="5594678" cy="3327138"/>
+            <a:off x="1712396" y="1287462"/>
+            <a:ext cx="9144000" cy="5437909"/>
           </a:xfrm>
           <a:prstGeom prst="rect">
             <a:avLst/>
           </a:prstGeom>
         </p:spPr>
       </p:pic>
-      <p:sp>
-        <p:nvSpPr>
-          <p:cNvPr id="3" name="TextBox 2"/>
-          <p:cNvSpPr txBox="1"/>
-          <p:nvPr/>
-        </p:nvSpPr>
-        <p:spPr>
-          <a:xfrm>
-            <a:off x="350837" y="3456572"/>
-            <a:ext cx="6444920" cy="2631490"/>
-          </a:xfrm>
-          <a:prstGeom prst="rect">
-            <a:avLst/>
-          </a:prstGeom>
-          <a:noFill/>
-        </p:spPr>
-        <p:txBody>
-          <a:bodyPr wrap="square" lIns="182880" tIns="146304" rIns="182880" bIns="146304" rtlCol="0">
-            <a:spAutoFit/>
-          </a:bodyPr>
-          <a:lstStyle/>
-          <a:p>
-            <a:pPr>
-              <a:lnSpc>
-                <a:spcPct val="90000"/>
-              </a:lnSpc>
-              <a:spcAft>
-                <a:spcPts val="600"/>
-              </a:spcAft>
-            </a:pPr>
-            <a:r>
-              <a:rPr lang="en-US" sz="3200" dirty="0">
-                <a:solidFill>
-                  <a:schemeClr val="accent2">
-                    <a:lumMod val="50000"/>
-                    <a:lumOff val="50000"/>
-                  </a:schemeClr>
-                </a:solidFill>
-              </a:rPr>
-              <a:t>Grouped into Node Types</a:t>
-            </a:r>
-          </a:p>
-          <a:p>
-            <a:pPr>
-              <a:lnSpc>
-                <a:spcPct val="90000"/>
-              </a:lnSpc>
-              <a:spcAft>
-                <a:spcPts val="600"/>
-              </a:spcAft>
-            </a:pPr>
-            <a:r>
-              <a:rPr lang="en-US" sz="2400" dirty="0">
-                <a:gradFill>
-                  <a:gsLst>
-                    <a:gs pos="2917">
-                      <a:schemeClr val="tx1"/>
-                    </a:gs>
-                    <a:gs pos="30000">
-                      <a:schemeClr val="tx1"/>
-                    </a:gs>
-                  </a:gsLst>
-                  <a:lin ang="5400000" scaled="0"/>
-                </a:gradFill>
-              </a:rPr>
-              <a:t>A “node type” is a group of nodes with similar properties. </a:t>
-            </a:r>
-          </a:p>
-          <a:p>
-            <a:pPr>
-              <a:lnSpc>
-                <a:spcPct val="90000"/>
-              </a:lnSpc>
-              <a:spcAft>
-                <a:spcPts val="600"/>
-              </a:spcAft>
-            </a:pPr>
-            <a:endParaRPr lang="en-US" sz="2400" dirty="0">
-              <a:gradFill>
-                <a:gsLst>
-                  <a:gs pos="2917">
-                    <a:schemeClr val="tx1"/>
-                  </a:gs>
-                  <a:gs pos="30000">
-                    <a:schemeClr val="tx1"/>
-                  </a:gs>
-                </a:gsLst>
-                <a:lin ang="5400000" scaled="0"/>
-              </a:gradFill>
-            </a:endParaRPr>
-          </a:p>
-          <a:p>
-            <a:pPr>
-              <a:lnSpc>
-                <a:spcPct val="90000"/>
-              </a:lnSpc>
-              <a:spcAft>
-                <a:spcPts val="600"/>
-              </a:spcAft>
-            </a:pPr>
-            <a:r>
-              <a:rPr lang="en-US" sz="2400" dirty="0">
-                <a:gradFill>
-                  <a:gsLst>
-                    <a:gs pos="2917">
-                      <a:schemeClr val="tx1"/>
-                    </a:gs>
-                    <a:gs pos="30000">
-                      <a:schemeClr val="tx1"/>
-                    </a:gs>
-                  </a:gsLst>
-                  <a:lin ang="5400000" scaled="0"/>
-                </a:gradFill>
-              </a:rPr>
-              <a:t>Describes items such as the capacity and placement properties of each node.</a:t>
-            </a:r>
-          </a:p>
-        </p:txBody>
-      </p:sp>
-      <p:sp>
-        <p:nvSpPr>
-          <p:cNvPr id="7" name="Rectangle 6"/>
-          <p:cNvSpPr/>
-          <p:nvPr/>
-        </p:nvSpPr>
-        <p:spPr>
-          <a:xfrm>
-            <a:off x="427039" y="1492926"/>
-            <a:ext cx="10401463" cy="1692771"/>
-          </a:xfrm>
-          <a:prstGeom prst="rect">
-            <a:avLst/>
-          </a:prstGeom>
-        </p:spPr>
-        <p:txBody>
-          <a:bodyPr wrap="square">
-            <a:spAutoFit/>
-          </a:bodyPr>
-          <a:lstStyle/>
-          <a:p>
-            <a:r>
-              <a:rPr lang="en-US" sz="3200" dirty="0">
-                <a:solidFill>
-                  <a:schemeClr val="accent2">
-                    <a:lumMod val="50000"/>
-                    <a:lumOff val="50000"/>
-                  </a:schemeClr>
-                </a:solidFill>
-              </a:rPr>
-              <a:t>A single server instance (physical or virtual)</a:t>
-            </a:r>
-          </a:p>
-          <a:p>
-            <a:pPr marL="571500" indent="-571500">
-              <a:buFont typeface="Arial" panose="020B0604020202020204" pitchFamily="34" charset="0"/>
-              <a:buChar char="•"/>
-            </a:pPr>
-            <a:r>
-              <a:rPr lang="en-US" sz="2400" dirty="0"/>
-              <a:t>Is a host for Service Fabric managed processes</a:t>
-            </a:r>
-          </a:p>
-          <a:p>
-            <a:pPr marL="571500" indent="-571500">
-              <a:buFont typeface="Arial" panose="020B0604020202020204" pitchFamily="34" charset="0"/>
-              <a:buChar char="•"/>
-            </a:pPr>
-            <a:r>
-              <a:rPr lang="en-US" sz="2400" dirty="0"/>
-              <a:t>Contains code and configuration</a:t>
-            </a:r>
-          </a:p>
-          <a:p>
-            <a:pPr marL="571500" indent="-571500">
-              <a:buFont typeface="Arial" panose="020B0604020202020204" pitchFamily="34" charset="0"/>
-              <a:buChar char="•"/>
-            </a:pPr>
-            <a:r>
-              <a:rPr lang="en-US" sz="2400" dirty="0"/>
-              <a:t>Associated with a Service Fabric “Node Type”</a:t>
-            </a:r>
-          </a:p>
-        </p:txBody>
-      </p:sp>
     </p:spTree>
     <p:extLst>
       <p:ext uri="{BB962C8B-B14F-4D97-AF65-F5344CB8AC3E}">
@@ -36493,7 +36376,7 @@
         </p:nvGrpSpPr>
         <p:grpSpPr>
           <a:xfrm>
-            <a:off x="339638" y="3268662"/>
+            <a:off x="6118772" y="2430462"/>
             <a:ext cx="6043065" cy="2190390"/>
             <a:chOff x="285233" y="3497262"/>
             <a:chExt cx="6043065" cy="2190390"/>
@@ -36577,10 +36460,10 @@
         </p:nvGrpSpPr>
         <p:grpSpPr>
           <a:xfrm>
-            <a:off x="6398901" y="3255462"/>
-            <a:ext cx="5768428" cy="2203590"/>
+            <a:off x="449809" y="3745269"/>
+            <a:ext cx="9507763" cy="2952392"/>
             <a:chOff x="6412866" y="3497261"/>
-            <a:chExt cx="5768428" cy="2203590"/>
+            <a:chExt cx="9507763" cy="2952392"/>
           </a:xfrm>
         </p:grpSpPr>
         <p:sp>
@@ -36644,8 +36527,8 @@
           </p:blipFill>
           <p:spPr>
             <a:xfrm>
-              <a:off x="6552019" y="4573587"/>
-              <a:ext cx="5629275" cy="1127264"/>
+              <a:off x="6552019" y="4573586"/>
+              <a:ext cx="9368610" cy="1876067"/>
             </a:xfrm>
             <a:prstGeom prst="rect">
               <a:avLst/>
@@ -37484,8 +37367,8 @@
         </p:nvGrpSpPr>
         <p:grpSpPr>
           <a:xfrm>
-            <a:off x="493574" y="2185401"/>
-            <a:ext cx="5048250" cy="3514725"/>
+            <a:off x="493573" y="2185401"/>
+            <a:ext cx="6258063" cy="4436061"/>
             <a:chOff x="7199174" y="830262"/>
             <a:chExt cx="5048250" cy="3514725"/>
           </a:xfrm>
@@ -37683,8 +37566,8 @@
         </p:nvGrpSpPr>
         <p:grpSpPr>
           <a:xfrm>
-            <a:off x="1309359" y="3599124"/>
-            <a:ext cx="5594678" cy="3327138"/>
+            <a:off x="274639" y="2328502"/>
+            <a:ext cx="6629398" cy="4597760"/>
             <a:chOff x="1646237" y="3504317"/>
             <a:chExt cx="5594678" cy="3327138"/>
           </a:xfrm>
@@ -39346,15 +39229,6 @@
 </file>
 
 <file path=customXml/item1.xml><?xml version="1.0" encoding="utf-8"?>
-<?mso-contentType ?>
-<FormTemplates xmlns="http://schemas.microsoft.com/sharepoint/v3/contenttype/forms">
-  <Display>DocumentLibraryForm</Display>
-  <Edit>DocumentLibraryForm</Edit>
-  <New>DocumentLibraryForm</New>
-</FormTemplates>
-</file>
-
-<file path=customXml/item2.xml><?xml version="1.0" encoding="utf-8"?>
 <ct:contentTypeSchema xmlns:ct="http://schemas.microsoft.com/office/2006/metadata/contentType" xmlns:ma="http://schemas.microsoft.com/office/2006/metadata/properties/metaAttributes" ct:_="" ma:_="" ma:contentTypeName="PresentationsDoc" ma:contentTypeID="0x01010031DCF4CA090F824DB1E4CCBB6B9D64EA00101E8AAD132F8F4D96340D6376C8BB3E" ma:contentTypeVersion="26" ma:contentTypeDescription="" ma:contentTypeScope="" ma:versionID="637d2002f1ba4164d39fe098da629583">
   <xsd:schema xmlns:xsd="http://www.w3.org/2001/XMLSchema" xmlns:xs="http://www.w3.org/2001/XMLSchema" xmlns:p="http://schemas.microsoft.com/office/2006/metadata/properties" xmlns:ns1="http://schemas.microsoft.com/sharepoint/v3" xmlns:ns2="01c77077-aee4-4b5f-bd4e-9cd40a6fff29" xmlns:ns3="230e9df3-be65-4c73-a93b-d1236ebd677e" xmlns:ns5="8ff673fc-3231-4e3a-893b-6d7f7cd32766" targetNamespace="http://schemas.microsoft.com/office/2006/metadata/properties" ma:root="true" ma:fieldsID="3017d9e36cc87838c67006ed06be3b3f" ns1:_="" ns2:_="" ns3:_="" ns5:_="">
     <xsd:import namespace="http://schemas.microsoft.com/sharepoint/v3"/>
@@ -39737,7 +39611,7 @@
 </ct:contentTypeSchema>
 </file>
 
-<file path=customXml/item3.xml><?xml version="1.0" encoding="utf-8"?>
+<file path=customXml/item2.xml><?xml version="1.0" encoding="utf-8"?>
 <p:properties xmlns:p="http://schemas.microsoft.com/office/2006/metadata/properties" xmlns:xsi="http://www.w3.org/2001/XMLSchema-instance" xmlns:pc="http://schemas.microsoft.com/office/infopath/2007/PartnerControls">
   <documentManagement>
     <LikesCount xmlns="http://schemas.microsoft.com/sharepoint/v3" xsi:nil="true"/>
@@ -39818,15 +39692,16 @@
 </p:properties>
 </file>
 
-<file path=customXml/itemProps1.xml><?xml version="1.0" encoding="utf-8"?>
-<ds:datastoreItem xmlns:ds="http://schemas.openxmlformats.org/officeDocument/2006/customXml" ds:itemID="{758FDAC0-319D-4A54-8D8E-1D42CB1F8004}">
-  <ds:schemaRefs>
-    <ds:schemaRef ds:uri="http://schemas.microsoft.com/sharepoint/v3/contenttype/forms"/>
-  </ds:schemaRefs>
-</ds:datastoreItem>
+<file path=customXml/item3.xml><?xml version="1.0" encoding="utf-8"?>
+<?mso-contentType ?>
+<FormTemplates xmlns="http://schemas.microsoft.com/sharepoint/v3/contenttype/forms">
+  <Display>DocumentLibraryForm</Display>
+  <Edit>DocumentLibraryForm</Edit>
+  <New>DocumentLibraryForm</New>
+</FormTemplates>
 </file>
 
-<file path=customXml/itemProps2.xml><?xml version="1.0" encoding="utf-8"?>
+<file path=customXml/itemProps1.xml><?xml version="1.0" encoding="utf-8"?>
 <ds:datastoreItem xmlns:ds="http://schemas.openxmlformats.org/officeDocument/2006/customXml" ds:itemID="{DC1FDA5B-0E88-4BFF-BA4D-5ECB6C5776B2}">
   <ds:schemaRefs>
     <ds:schemaRef ds:uri="http://schemas.microsoft.com/office/2006/metadata/contentType"/>
@@ -39847,7 +39722,7 @@
 </ds:datastoreItem>
 </file>
 
-<file path=customXml/itemProps3.xml><?xml version="1.0" encoding="utf-8"?>
+<file path=customXml/itemProps2.xml><?xml version="1.0" encoding="utf-8"?>
 <ds:datastoreItem xmlns:ds="http://schemas.openxmlformats.org/officeDocument/2006/customXml" ds:itemID="{F990F116-B58F-4255-B05B-DA3808E0E5C6}">
   <ds:schemaRefs>
     <ds:schemaRef ds:uri="http://schemas.microsoft.com/office/2006/documentManagement/types"/>
@@ -39864,4 +39739,12 @@
     <ds:schemaRef ds:uri="http://purl.org/dc/dcmitype/"/>
   </ds:schemaRefs>
 </ds:datastoreItem>
+</file>
+
+<file path=customXml/itemProps3.xml><?xml version="1.0" encoding="utf-8"?>
+<ds:datastoreItem xmlns:ds="http://schemas.openxmlformats.org/officeDocument/2006/customXml" ds:itemID="{758FDAC0-319D-4A54-8D8E-1D42CB1F8004}">
+  <ds:schemaRefs>
+    <ds:schemaRef ds:uri="http://schemas.microsoft.com/sharepoint/v3/contenttype/forms"/>
+  </ds:schemaRefs>
+</ds:datastoreItem>
 </file>
</xml_diff>